<commit_message>
pitch real time graphs
</commit_message>
<xml_diff>
--- a/docs/Presentations/Final_presentation.pptx
+++ b/docs/Presentations/Final_presentation.pptx
@@ -245,7 +245,7 @@
           <a:p>
             <a:fld id="{81108FBB-5C78-CF4C-B054-5DD258793CDB}" type="datetimeFigureOut">
               <a:rPr lang="en-US" smtClean="0"/>
-              <a:t>6/23/2022</a:t>
+              <a:t>6/29/2022</a:t>
             </a:fld>
             <a:endParaRPr lang="en-US"/>
           </a:p>
@@ -2894,7 +2894,7 @@
           <a:p>
             <a:fld id="{F95AA93C-AC25-7D4A-8787-2982570C5801}" type="datetime1">
               <a:rPr lang="en-US" smtClean="0"/>
-              <a:t>6/23/2022</a:t>
+              <a:t>6/29/2022</a:t>
             </a:fld>
             <a:endParaRPr lang="en-US"/>
           </a:p>
@@ -3104,7 +3104,7 @@
           <a:p>
             <a:fld id="{304BE462-4DE4-FE48-A6DC-6029F8C08C1B}" type="datetime1">
               <a:rPr lang="en-US" smtClean="0"/>
-              <a:t>6/23/2022</a:t>
+              <a:t>6/29/2022</a:t>
             </a:fld>
             <a:endParaRPr lang="en-US"/>
           </a:p>
@@ -3629,7 +3629,7 @@
           <a:p>
             <a:fld id="{9A93461D-F3AE-DA45-8204-9CCC04547CDF}" type="datetime1">
               <a:rPr lang="en-US" smtClean="0"/>
-              <a:t>6/23/2022</a:t>
+              <a:t>6/29/2022</a:t>
             </a:fld>
             <a:endParaRPr lang="en-US"/>
           </a:p>
@@ -3897,7 +3897,7 @@
           <a:p>
             <a:fld id="{6EE40EA7-3CF7-3946-A6D4-42FC1CF5E38A}" type="datetime1">
               <a:rPr lang="en-US" smtClean="0"/>
-              <a:t>6/23/2022</a:t>
+              <a:t>6/29/2022</a:t>
             </a:fld>
             <a:endParaRPr lang="en-US"/>
           </a:p>
@@ -4312,7 +4312,7 @@
           <a:p>
             <a:fld id="{36B08F9E-1372-2D43-9171-72D3A9C3F3E7}" type="datetime1">
               <a:rPr lang="en-US" smtClean="0"/>
-              <a:t>6/23/2022</a:t>
+              <a:t>6/29/2022</a:t>
             </a:fld>
             <a:endParaRPr lang="en-US"/>
           </a:p>
@@ -4454,7 +4454,7 @@
           <a:p>
             <a:fld id="{127C2F05-4BC6-E442-8195-86345B49EB50}" type="datetime1">
               <a:rPr lang="en-US" smtClean="0"/>
-              <a:t>6/23/2022</a:t>
+              <a:t>6/29/2022</a:t>
             </a:fld>
             <a:endParaRPr lang="en-US"/>
           </a:p>
@@ -4567,7 +4567,7 @@
           <a:p>
             <a:fld id="{491C489C-5506-C74B-82FF-8B2FE41802D8}" type="datetime1">
               <a:rPr lang="en-US" smtClean="0"/>
-              <a:t>6/23/2022</a:t>
+              <a:t>6/29/2022</a:t>
             </a:fld>
             <a:endParaRPr lang="en-US"/>
           </a:p>
@@ -4880,7 +4880,7 @@
           <a:p>
             <a:fld id="{41214FB5-589B-7146-BB27-2F6492521322}" type="datetime1">
               <a:rPr lang="en-US" smtClean="0"/>
-              <a:t>6/23/2022</a:t>
+              <a:t>6/29/2022</a:t>
             </a:fld>
             <a:endParaRPr lang="en-US"/>
           </a:p>
@@ -5173,7 +5173,7 @@
           <a:p>
             <a:fld id="{DFD0CB20-DEC6-BA41-B9E0-2FB949C3D291}" type="datetime1">
               <a:rPr lang="en-US" smtClean="0"/>
-              <a:t>6/23/2022</a:t>
+              <a:t>6/29/2022</a:t>
             </a:fld>
             <a:endParaRPr lang="en-US"/>
           </a:p>
@@ -5446,7 +5446,7 @@
           <a:p>
             <a:fld id="{064A1EA6-C1E7-2844-934E-35189B8549EC}" type="datetime1">
               <a:rPr lang="en-US" smtClean="0"/>
-              <a:t>6/23/2022</a:t>
+              <a:t>6/29/2022</a:t>
             </a:fld>
             <a:endParaRPr lang="en-US"/>
           </a:p>
@@ -5962,6 +5962,93 @@
           </a:p>
           <a:p>
             <a:endParaRPr lang="en-US" noProof="0" dirty="0"/>
+          </a:p>
+        </p:txBody>
+      </p:sp>
+      <p:sp>
+        <p:nvSpPr>
+          <p:cNvPr id="8" name="Tekstvak 7">
+            <a:extLst>
+              <a:ext uri="{FF2B5EF4-FFF2-40B4-BE49-F238E27FC236}">
+                <a16:creationId xmlns:a16="http://schemas.microsoft.com/office/drawing/2014/main" id="{84616169-FF3A-9353-34D8-CEEDDB7EB8F8}"/>
+              </a:ext>
+            </a:extLst>
+          </p:cNvPr>
+          <p:cNvSpPr txBox="1"/>
+          <p:nvPr/>
+        </p:nvSpPr>
+        <p:spPr>
+          <a:xfrm>
+            <a:off x="2194560" y="4520908"/>
+            <a:ext cx="6096000" cy="369332"/>
+          </a:xfrm>
+          <a:prstGeom prst="rect">
+            <a:avLst/>
+          </a:prstGeom>
+          <a:noFill/>
+        </p:spPr>
+        <p:txBody>
+          <a:bodyPr wrap="square">
+            <a:spAutoFit/>
+          </a:bodyPr>
+          <a:lstStyle/>
+          <a:p>
+            <a:r>
+              <a:rPr lang="nl-BE"/>
+              <a:t>Supervisors: Prof. dr. ir. Hiep Luong, Prof. dr. ir. Jan Aelterman</a:t>
+            </a:r>
+            <a:endParaRPr lang="en-US" dirty="0"/>
+          </a:p>
+        </p:txBody>
+      </p:sp>
+      <p:sp>
+        <p:nvSpPr>
+          <p:cNvPr id="10" name="Tekstvak 9">
+            <a:extLst>
+              <a:ext uri="{FF2B5EF4-FFF2-40B4-BE49-F238E27FC236}">
+                <a16:creationId xmlns:a16="http://schemas.microsoft.com/office/drawing/2014/main" id="{38823E28-18A9-A33F-03EC-4E5985C8A949}"/>
+              </a:ext>
+            </a:extLst>
+          </p:cNvPr>
+          <p:cNvSpPr txBox="1"/>
+          <p:nvPr/>
+        </p:nvSpPr>
+        <p:spPr>
+          <a:xfrm>
+            <a:off x="2194560" y="4796398"/>
+            <a:ext cx="6096000" cy="646331"/>
+          </a:xfrm>
+          <a:prstGeom prst="rect">
+            <a:avLst/>
+          </a:prstGeom>
+          <a:noFill/>
+        </p:spPr>
+        <p:txBody>
+          <a:bodyPr wrap="square">
+            <a:spAutoFit/>
+          </a:bodyPr>
+          <a:lstStyle/>
+          <a:p>
+            <a:r>
+              <a:rPr lang="nl-BE" dirty="0" err="1"/>
+              <a:t>Counsellors</a:t>
+            </a:r>
+            <a:r>
+              <a:rPr lang="nl-BE" dirty="0"/>
+              <a:t>: Charles Hamesse, Ir. Tien-</a:t>
+            </a:r>
+            <a:r>
+              <a:rPr lang="nl-BE" dirty="0" err="1"/>
+              <a:t>Thanh</a:t>
+            </a:r>
+            <a:r>
+              <a:rPr lang="nl-BE" dirty="0"/>
+              <a:t> Nguyen (Royal Military </a:t>
+            </a:r>
+            <a:r>
+              <a:rPr lang="en-US" dirty="0"/>
+              <a:t>Academy), Dr. ir. Benoit Pairet (Royal Military Academy)</a:t>
+            </a:r>
           </a:p>
         </p:txBody>
       </p:sp>

</xml_diff>